<commit_message>
fixed android codova native issues
</commit_message>
<xml_diff>
--- a/SHDD Mobile Presentation.pptx
+++ b/SHDD Mobile Presentation.pptx
@@ -2328,59 +2328,6 @@
             <a:normAutofit/>
           </a:bodyPr>
           <a:lstStyle/>
-          <a:p>
-            <a:pPr marL="0" marR="0" indent="0" algn="l" defTabSz="457200" rtl="0" eaLnBrk="1" fontAlgn="auto" latinLnBrk="0" hangingPunct="1">
-              <a:lnSpc>
-                <a:spcPct val="100000"/>
-              </a:lnSpc>
-              <a:spcBef>
-                <a:spcPts val="0"/>
-              </a:spcBef>
-              <a:spcAft>
-                <a:spcPts val="0"/>
-              </a:spcAft>
-              <a:buClrTx/>
-              <a:buSzTx/>
-              <a:buFontTx/>
-              <a:buNone/>
-              <a:tabLst/>
-              <a:defRPr/>
-            </a:pPr>
-            <a:r>
-              <a:rPr lang="en-US" dirty="0" smtClean="0"/>
-              <a:t>Mobile Devices are changing the way we develop. Mobile use may usurp desktop/laptop use as the preferred experience.</a:t>
-            </a:r>
-          </a:p>
-          <a:p>
-            <a:endParaRPr lang="en-US" dirty="0" smtClean="0"/>
-          </a:p>
-          <a:p>
-            <a:r>
-              <a:rPr lang="en-US" dirty="0" smtClean="0"/>
-              <a:t>Applications are no longer monolithic apps that do everything. Applications are now smaller, hyper focused and unchained by location.</a:t>
-            </a:r>
-          </a:p>
-          <a:p>
-            <a:r>
-              <a:rPr lang="en-US" dirty="0" smtClean="0"/>
-              <a:t>In mobile, the application is the sum of all its parts and those parts are the hyper focused individual apps.</a:t>
-            </a:r>
-          </a:p>
-          <a:p>
-            <a:endParaRPr lang="en-US" dirty="0" smtClean="0"/>
-          </a:p>
-          <a:p>
-            <a:r>
-              <a:rPr lang="en-US" dirty="0" smtClean="0"/>
-              <a:t>Future development may sidestep the large desktop experience with mobile as the augmenter, to a Mobile first approach.</a:t>
-            </a:r>
-          </a:p>
-          <a:p>
-            <a:r>
-              <a:rPr lang="en-US" dirty="0" smtClean="0"/>
-              <a:t>How do we evolve to a new development landscape that requires rapidly deploying smaller plank applications?</a:t>
-            </a:r>
-          </a:p>
           <a:p>
             <a:endParaRPr lang="en-US" dirty="0"/>
           </a:p>
@@ -11493,7 +11440,7 @@
         <p:spPr/>
         <p:txBody>
           <a:bodyPr>
-            <a:normAutofit lnSpcReduction="10000"/>
+            <a:normAutofit fontScale="92500" lnSpcReduction="10000"/>
           </a:bodyPr>
           <a:lstStyle/>
           <a:p>
@@ -11524,8 +11471,48 @@
                   <a:srgbClr val="FFFFFF"/>
                 </a:solidFill>
               </a:rPr>
-              <a:t>Nothing to install</a:t>
-            </a:r>
+              <a:t>Nothing to </a:t>
+            </a:r>
+            <a:r>
+              <a:rPr lang="en-US" dirty="0" smtClean="0">
+                <a:solidFill>
+                  <a:srgbClr val="FFFFFF"/>
+                </a:solidFill>
+              </a:rPr>
+              <a:t>install other than your preferred IDE</a:t>
+            </a:r>
+          </a:p>
+          <a:p>
+            <a:pPr lvl="2"/>
+            <a:r>
+              <a:rPr lang="en-US" dirty="0" smtClean="0">
+                <a:solidFill>
+                  <a:srgbClr val="FFFFFF"/>
+                </a:solidFill>
+              </a:rPr>
+              <a:t>Hint Hint… </a:t>
+            </a:r>
+            <a:r>
+              <a:rPr lang="en-US" dirty="0" smtClean="0">
+                <a:solidFill>
+                  <a:srgbClr val="FFFFFF"/>
+                </a:solidFill>
+              </a:rPr>
+              <a:t>U</a:t>
+            </a:r>
+            <a:r>
+              <a:rPr lang="en-US" dirty="0" smtClean="0">
+                <a:solidFill>
+                  <a:srgbClr val="FFFFFF"/>
+                </a:solidFill>
+              </a:rPr>
+              <a:t>SE INTELIJ! It’s Free and has Android support</a:t>
+            </a:r>
+            <a:endParaRPr lang="en-US" dirty="0" smtClean="0">
+              <a:solidFill>
+                <a:srgbClr val="FFFFFF"/>
+              </a:solidFill>
+            </a:endParaRPr>
           </a:p>
           <a:p>
             <a:r>

</xml_diff>

<commit_message>
yet another presentation tweak
</commit_message>
<xml_diff>
--- a/SHDD Mobile Presentation.pptx
+++ b/SHDD Mobile Presentation.pptx
@@ -1493,11 +1493,7 @@
             </a:r>
             <a:r>
               <a:rPr lang="en-US" baseline="0" dirty="0" smtClean="0"/>
-              <a:t> needs. The total sum of all mobile applications is the whole enterprise application with a tailored user experiences</a:t>
-            </a:r>
-            <a:r>
-              <a:rPr lang="en-US" baseline="0" dirty="0" smtClean="0"/>
-              <a:t>. Think of what you really want to do on your banking app.</a:t>
+              <a:t> needs. The total sum of all mobile applications is the whole enterprise application with a tailored user experiences. Think of what you really want to do on your banking app.</a:t>
             </a:r>
             <a:endParaRPr lang="en-US" dirty="0" smtClean="0"/>
           </a:p>
@@ -7117,7 +7113,11 @@
           <a:p>
             <a:r>
               <a:rPr lang="en-US" dirty="0" smtClean="0"/>
-              <a:t>Kitsch or the future?</a:t>
+              <a:t>Hype Machine or </a:t>
+            </a:r>
+            <a:r>
+              <a:rPr lang="en-US" dirty="0" smtClean="0"/>
+              <a:t>the future?</a:t>
             </a:r>
           </a:p>
           <a:p>
@@ -8606,27 +8606,7 @@
           <a:p>
             <a:r>
               <a:rPr lang="en-US" dirty="0" smtClean="0"/>
-              <a:t>Reduce 20 clicks to a gesture, swipe, tilt, point, shoot, </a:t>
-            </a:r>
-            <a:r>
-              <a:rPr lang="en-US" dirty="0" smtClean="0"/>
-              <a:t>speak, </a:t>
-            </a:r>
-            <a:r>
-              <a:rPr lang="en-US" dirty="0" smtClean="0"/>
-              <a:t>touch, feel, notification, push, pull, bump, </a:t>
-            </a:r>
-            <a:r>
-              <a:rPr lang="en-US" dirty="0" smtClean="0"/>
-              <a:t>beam, draw </a:t>
-            </a:r>
-            <a:r>
-              <a:rPr lang="en-US" dirty="0" smtClean="0"/>
-              <a:t>and whatever else comes along</a:t>
-            </a:r>
-            <a:r>
-              <a:rPr lang="en-US" dirty="0" smtClean="0"/>
-              <a:t>.</a:t>
+              <a:t>Reduce 20 clicks to a gesture, swipe, tilt, point, shoot, speak, touch, feel, notification, push, pull, bump, beam, draw and whatever else comes along.</a:t>
             </a:r>
           </a:p>
           <a:p>
@@ -8634,7 +8614,6 @@
               <a:rPr lang="en-US" dirty="0" smtClean="0"/>
               <a:t>Interact with your user and their environment</a:t>
             </a:r>
-            <a:endParaRPr lang="en-US" dirty="0" smtClean="0"/>
           </a:p>
         </p:txBody>
       </p:sp>
@@ -10968,59 +10947,35 @@
           <a:p>
             <a:r>
               <a:rPr lang="en-US" dirty="0" smtClean="0"/>
-              <a:t>Native experience with dynami</a:t>
-            </a:r>
-            <a:r>
-              <a:rPr lang="en-US" dirty="0" smtClean="0"/>
-              <a:t>c web content</a:t>
-            </a:r>
-            <a:endParaRPr lang="en-US" dirty="0" smtClean="0"/>
+              <a:t>Native experience with dynamic web content</a:t>
+            </a:r>
           </a:p>
           <a:p>
             <a:r>
               <a:rPr lang="en-US" dirty="0" smtClean="0"/>
               <a:t>Pros</a:t>
             </a:r>
-            <a:endParaRPr lang="en-US" dirty="0" smtClean="0"/>
           </a:p>
           <a:p>
             <a:pPr lvl="1"/>
             <a:r>
               <a:rPr lang="en-US" dirty="0" smtClean="0"/>
-              <a:t>Get your native </a:t>
-            </a:r>
-            <a:r>
-              <a:rPr lang="en-US" dirty="0" smtClean="0"/>
-              <a:t>on</a:t>
+              <a:t>Get your native on</a:t>
             </a:r>
           </a:p>
           <a:p>
             <a:pPr lvl="1"/>
             <a:r>
               <a:rPr lang="en-US" dirty="0" smtClean="0"/>
-              <a:t>Smoother user </a:t>
-            </a:r>
-            <a:r>
-              <a:rPr lang="en-US" dirty="0" smtClean="0"/>
-              <a:t>experience</a:t>
-            </a:r>
-            <a:endParaRPr lang="en-US" dirty="0" smtClean="0"/>
+              <a:t>Smoother user experience</a:t>
+            </a:r>
           </a:p>
           <a:p>
             <a:pPr lvl="1"/>
             <a:r>
               <a:rPr lang="en-US" dirty="0" smtClean="0"/>
-              <a:t>Web Views can re-leverage your</a:t>
-            </a:r>
-            <a:r>
-              <a:rPr lang="en-US" dirty="0" smtClean="0"/>
-              <a:t> already existing web </a:t>
-            </a:r>
-            <a:r>
-              <a:rPr lang="en-US" dirty="0" smtClean="0"/>
-              <a:t>content</a:t>
-            </a:r>
-            <a:endParaRPr lang="en-US" dirty="0" smtClean="0"/>
+              <a:t>Web Views can re-leverage your already existing web content</a:t>
+            </a:r>
           </a:p>
           <a:p>
             <a:pPr lvl="1"/>
@@ -11112,7 +11067,6 @@
               <a:rPr lang="en-US" dirty="0" smtClean="0"/>
               <a:t>Still requires four separate development efforts for the app itself, but not the content.</a:t>
             </a:r>
-            <a:endParaRPr lang="en-US" dirty="0" smtClean="0"/>
           </a:p>
         </p:txBody>
       </p:sp>
@@ -11440,7 +11394,7 @@
         <p:spPr/>
         <p:txBody>
           <a:bodyPr>
-            <a:normAutofit fontScale="92500" lnSpcReduction="10000"/>
+            <a:normAutofit fontScale="92500" lnSpcReduction="20000"/>
           </a:bodyPr>
           <a:lstStyle/>
           <a:p>
@@ -11462,6 +11416,11 @@
               </a:rPr>
               <a:t>Android Geeks</a:t>
             </a:r>
+            <a:endParaRPr lang="en-US" dirty="0" smtClean="0">
+              <a:solidFill>
+                <a:srgbClr val="FFFFFF"/>
+              </a:solidFill>
+            </a:endParaRPr>
           </a:p>
           <a:p>
             <a:pPr lvl="1"/>
@@ -11471,48 +11430,19 @@
                   <a:srgbClr val="FFFFFF"/>
                 </a:solidFill>
               </a:rPr>
-              <a:t>Nothing to </a:t>
-            </a:r>
+              <a:t>Install your preferred IDE and the Android SDK</a:t>
+            </a:r>
+          </a:p>
+          <a:p>
+            <a:pPr lvl="2"/>
             <a:r>
               <a:rPr lang="en-US" dirty="0" smtClean="0">
                 <a:solidFill>
                   <a:srgbClr val="FFFFFF"/>
                 </a:solidFill>
               </a:rPr>
-              <a:t>install other than your preferred IDE</a:t>
-            </a:r>
-          </a:p>
-          <a:p>
-            <a:pPr lvl="2"/>
-            <a:r>
-              <a:rPr lang="en-US" dirty="0" smtClean="0">
-                <a:solidFill>
-                  <a:srgbClr val="FFFFFF"/>
-                </a:solidFill>
-              </a:rPr>
-              <a:t>Hint Hint… </a:t>
-            </a:r>
-            <a:r>
-              <a:rPr lang="en-US" dirty="0" smtClean="0">
-                <a:solidFill>
-                  <a:srgbClr val="FFFFFF"/>
-                </a:solidFill>
-              </a:rPr>
-              <a:t>U</a:t>
-            </a:r>
-            <a:r>
-              <a:rPr lang="en-US" dirty="0" smtClean="0">
-                <a:solidFill>
-                  <a:srgbClr val="FFFFFF"/>
-                </a:solidFill>
-              </a:rPr>
-              <a:t>SE INTELIJ! It’s Free and has Android support</a:t>
-            </a:r>
-            <a:endParaRPr lang="en-US" dirty="0" smtClean="0">
-              <a:solidFill>
-                <a:srgbClr val="FFFFFF"/>
-              </a:solidFill>
-            </a:endParaRPr>
+              <a:t>Hint Hint… USE INTELIJ! It’s Free and has Android support</a:t>
+            </a:r>
           </a:p>
           <a:p>
             <a:r>
@@ -11552,9 +11482,50 @@
                 <a:solidFill>
                   <a:srgbClr val="FFFFFF"/>
                 </a:solidFill>
+              </a:rPr>
+              <a:t>Install </a:t>
+            </a:r>
+            <a:r>
+              <a:rPr lang="en-US" dirty="0" err="1" smtClean="0">
+                <a:solidFill>
+                  <a:srgbClr val="FFFFFF"/>
+                </a:solidFill>
+              </a:rPr>
+              <a:t>xCode</a:t>
+            </a:r>
+            <a:r>
+              <a:rPr lang="en-US" dirty="0" smtClean="0">
+                <a:solidFill>
+                  <a:srgbClr val="FFFFFF"/>
+                </a:solidFill>
+              </a:rPr>
+              <a:t> 4.x.x</a:t>
+            </a:r>
+            <a:endParaRPr lang="en-US" dirty="0" smtClean="0">
+              <a:solidFill>
+                <a:srgbClr val="FFFFFF"/>
+              </a:solidFill>
+            </a:endParaRPr>
+          </a:p>
+          <a:p>
+            <a:pPr lvl="1"/>
+            <a:r>
+              <a:rPr lang="en-US" dirty="0" smtClean="0">
+                <a:solidFill>
+                  <a:srgbClr val="FFFFFF"/>
+                </a:solidFill>
                 <a:hlinkClick r:id="rId4"/>
               </a:rPr>
-              <a:t>http://docs.phonegap.com/en/2.0.0/guide_getting-started_ios_index.md.html#Getting%20Started%20with%20iOS</a:t>
+              <a:t>http://docs.phonegap.com/en/2.0.0/guide_getting-started_ios_index.md.html#Getting%20Started%20with%</a:t>
+            </a:r>
+            <a:r>
+              <a:rPr lang="en-US" dirty="0" smtClean="0">
+                <a:solidFill>
+                  <a:srgbClr val="FFFFFF"/>
+                </a:solidFill>
+                <a:hlinkClick r:id="rId4"/>
+              </a:rPr>
+              <a:t>20iOS</a:t>
             </a:r>
             <a:endParaRPr lang="en-US" dirty="0" smtClean="0">
               <a:solidFill>
@@ -11722,12 +11693,20 @@
           </a:p>
           <a:p>
             <a:r>
+              <a:rPr lang="en-US" smtClean="0">
+                <a:solidFill>
+                  <a:srgbClr val="FFFFFF"/>
+                </a:solidFill>
+              </a:rPr>
+              <a:t>80% </a:t>
+            </a:r>
+            <a:r>
               <a:rPr lang="en-US" dirty="0" smtClean="0">
                 <a:solidFill>
                   <a:srgbClr val="FFFFFF"/>
                 </a:solidFill>
               </a:rPr>
-              <a:t>85% of us are Engineers</a:t>
+              <a:t>of us are Engineers</a:t>
             </a:r>
           </a:p>
           <a:p>

</xml_diff>